<commit_message>
R1 release of Module 3 lessons
</commit_message>
<xml_diff>
--- a/Instructor-Led/Module3/Lessons/Module3_Lesson10 Cross-Platform User Interfaces with Xamarin.Forms (Part 2).pptx
+++ b/Instructor-Led/Module3/Lessons/Module3_Lesson10 Cross-Platform User Interfaces with Xamarin.Forms (Part 2).pptx
@@ -138,7 +138,7 @@
   </p:defaultTextStyle>
   <p:extLst>
     <p:ext uri="{EFAFB233-063F-42B5-8137-9DF3F51BA10A}">
-      <p15:sldGuideLst xmlns:p15="http://schemas.microsoft.com/office/powerpoint/2012/main" xmlns="">
+      <p15:sldGuideLst xmlns="" xmlns:p15="http://schemas.microsoft.com/office/powerpoint/2012/main">
         <p15:guide id="1" orient="horz" pos="2160">
           <p15:clr>
             <a:srgbClr val="A4A3A4"/>
@@ -244,7 +244,7 @@
           <a:p>
             <a:fld id="{17D71989-5E53-5443-B1AE-527CBA6B448B}" type="datetimeFigureOut">
               <a:rPr lang="en-US" smtClean="0"/>
-              <a:t>6/17/16</a:t>
+              <a:t>6/28/16</a:t>
             </a:fld>
             <a:endParaRPr lang="en-US"/>
           </a:p>
@@ -5603,14 +5603,6 @@
               </a:rPr>
               <a:t>/1rowG7K</a:t>
             </a:r>
-            <a:endParaRPr lang="en-US" sz="1200" b="0" i="0" u="none" strike="noStrike" kern="1200" baseline="0" dirty="0" smtClean="0">
-              <a:solidFill>
-                <a:schemeClr val="tx1"/>
-              </a:solidFill>
-              <a:latin typeface="+mn-lt"/>
-              <a:ea typeface="+mn-ea"/>
-              <a:cs typeface="+mn-cs"/>
-            </a:endParaRPr>
           </a:p>
         </p:txBody>
       </p:sp>
@@ -6162,7 +6154,7 @@
           <a:p>
             <a:fld id="{0459C166-16D3-4A25-A2F8-C51E0E346B22}" type="datetimeFigureOut">
               <a:rPr lang="en-US" smtClean="0"/>
-              <a:t>6/17/16</a:t>
+              <a:t>6/28/16</a:t>
             </a:fld>
             <a:endParaRPr lang="en-US"/>
           </a:p>
@@ -6529,7 +6521,7 @@
           <a:p>
             <a:fld id="{0459C166-16D3-4A25-A2F8-C51E0E346B22}" type="datetimeFigureOut">
               <a:rPr lang="en-US" smtClean="0"/>
-              <a:t>6/17/16</a:t>
+              <a:t>6/28/16</a:t>
             </a:fld>
             <a:endParaRPr lang="en-US"/>
           </a:p>
@@ -6647,7 +6639,7 @@
           <a:p>
             <a:fld id="{0459C166-16D3-4A25-A2F8-C51E0E346B22}" type="datetimeFigureOut">
               <a:rPr lang="en-US" smtClean="0"/>
-              <a:t>6/17/16</a:t>
+              <a:t>6/28/16</a:t>
             </a:fld>
             <a:endParaRPr lang="en-US"/>
           </a:p>
@@ -6817,7 +6809,7 @@
           <a:p>
             <a:fld id="{0459C166-16D3-4A25-A2F8-C51E0E346B22}" type="datetimeFigureOut">
               <a:rPr lang="en-US" smtClean="0"/>
-              <a:t>6/17/16</a:t>
+              <a:t>6/28/16</a:t>
             </a:fld>
             <a:endParaRPr lang="en-US"/>
           </a:p>
@@ -7082,7 +7074,7 @@
             <a:fld id="{0459C166-16D3-4A25-A2F8-C51E0E346B22}" type="datetimeFigureOut">
               <a:rPr lang="en-US" smtClean="0"/>
               <a:pPr/>
-              <a:t>6/17/16</a:t>
+              <a:t>6/28/16</a:t>
             </a:fld>
             <a:endParaRPr lang="en-US"/>
           </a:p>
@@ -7401,7 +7393,7 @@
           <a:p>
             <a:fld id="{0459C166-16D3-4A25-A2F8-C51E0E346B22}" type="datetimeFigureOut">
               <a:rPr lang="en-US" smtClean="0"/>
-              <a:t>6/17/16</a:t>
+              <a:t>6/28/16</a:t>
             </a:fld>
             <a:endParaRPr lang="en-US"/>
           </a:p>
@@ -7798,7 +7790,7 @@
           <a:p>
             <a:fld id="{0459C166-16D3-4A25-A2F8-C51E0E346B22}" type="datetimeFigureOut">
               <a:rPr lang="en-US" smtClean="0"/>
-              <a:t>6/17/16</a:t>
+              <a:t>6/28/16</a:t>
             </a:fld>
             <a:endParaRPr lang="en-US"/>
           </a:p>
@@ -8768,7 +8760,7 @@
           <a:p>
             <a:fld id="{0459C166-16D3-4A25-A2F8-C51E0E346B22}" type="datetimeFigureOut">
               <a:rPr lang="en-US" smtClean="0"/>
-              <a:t>6/17/16</a:t>
+              <a:t>6/28/16</a:t>
             </a:fld>
             <a:endParaRPr lang="en-US"/>
           </a:p>
@@ -8980,7 +8972,7 @@
           <a:p>
             <a:fld id="{0459C166-16D3-4A25-A2F8-C51E0E346B22}" type="datetimeFigureOut">
               <a:rPr lang="en-US" smtClean="0"/>
-              <a:t>6/17/16</a:t>
+              <a:t>6/28/16</a:t>
             </a:fld>
             <a:endParaRPr lang="en-US"/>
           </a:p>
@@ -11102,14 +11094,14 @@
                 <a:gridCol w="5533314">
                   <a:extLst>
                     <a:ext uri="{9D8B030D-6E8A-4147-A177-3AD203B41FA5}">
-                      <a16:colId xmlns="" xmlns:a16="http://schemas.microsoft.com/office/drawing/2014/main" val="48614039"/>
+                      <a16:colId xmlns:a16="http://schemas.microsoft.com/office/drawing/2014/main" xmlns="" val="48614039"/>
                     </a:ext>
                   </a:extLst>
                 </a:gridCol>
                 <a:gridCol w="5533314">
                   <a:extLst>
                     <a:ext uri="{9D8B030D-6E8A-4147-A177-3AD203B41FA5}">
-                      <a16:colId xmlns="" xmlns:a16="http://schemas.microsoft.com/office/drawing/2014/main" val="1124546490"/>
+                      <a16:colId xmlns:a16="http://schemas.microsoft.com/office/drawing/2014/main" xmlns="" val="1124546490"/>
                     </a:ext>
                   </a:extLst>
                 </a:gridCol>
@@ -11161,7 +11153,7 @@
                 </a:tc>
                 <a:extLst>
                   <a:ext uri="{0D108BD9-81ED-4DB2-BD59-A6C34878D82A}">
-                    <a16:rowId xmlns="" xmlns:a16="http://schemas.microsoft.com/office/drawing/2014/main" val="679667022"/>
+                    <a16:rowId xmlns:a16="http://schemas.microsoft.com/office/drawing/2014/main" xmlns="" val="679667022"/>
                   </a:ext>
                 </a:extLst>
               </a:tr>
@@ -11209,7 +11201,7 @@
                 </a:tc>
                 <a:extLst>
                   <a:ext uri="{0D108BD9-81ED-4DB2-BD59-A6C34878D82A}">
-                    <a16:rowId xmlns="" xmlns:a16="http://schemas.microsoft.com/office/drawing/2014/main" val="2034482246"/>
+                    <a16:rowId xmlns:a16="http://schemas.microsoft.com/office/drawing/2014/main" xmlns="" val="2034482246"/>
                   </a:ext>
                 </a:extLst>
               </a:tr>
@@ -11257,7 +11249,7 @@
                 </a:tc>
                 <a:extLst>
                   <a:ext uri="{0D108BD9-81ED-4DB2-BD59-A6C34878D82A}">
-                    <a16:rowId xmlns="" xmlns:a16="http://schemas.microsoft.com/office/drawing/2014/main" val="682465758"/>
+                    <a16:rowId xmlns:a16="http://schemas.microsoft.com/office/drawing/2014/main" xmlns="" val="682465758"/>
                   </a:ext>
                 </a:extLst>
               </a:tr>
@@ -11308,7 +11300,7 @@
                 </a:tc>
                 <a:extLst>
                   <a:ext uri="{0D108BD9-81ED-4DB2-BD59-A6C34878D82A}">
-                    <a16:rowId xmlns="" xmlns:a16="http://schemas.microsoft.com/office/drawing/2014/main" val="4230228483"/>
+                    <a16:rowId xmlns:a16="http://schemas.microsoft.com/office/drawing/2014/main" xmlns="" val="4230228483"/>
                   </a:ext>
                 </a:extLst>
               </a:tr>
@@ -13442,14 +13434,14 @@
                 <a:gridCol w="5533314">
                   <a:extLst>
                     <a:ext uri="{9D8B030D-6E8A-4147-A177-3AD203B41FA5}">
-                      <a16:colId xmlns="" xmlns:a16="http://schemas.microsoft.com/office/drawing/2014/main" val="48614039"/>
+                      <a16:colId xmlns:a16="http://schemas.microsoft.com/office/drawing/2014/main" xmlns="" val="48614039"/>
                     </a:ext>
                   </a:extLst>
                 </a:gridCol>
                 <a:gridCol w="5533314">
                   <a:extLst>
                     <a:ext uri="{9D8B030D-6E8A-4147-A177-3AD203B41FA5}">
-                      <a16:colId xmlns="" xmlns:a16="http://schemas.microsoft.com/office/drawing/2014/main" val="1124546490"/>
+                      <a16:colId xmlns:a16="http://schemas.microsoft.com/office/drawing/2014/main" xmlns="" val="1124546490"/>
                     </a:ext>
                   </a:extLst>
                 </a:gridCol>
@@ -13501,7 +13493,7 @@
                 </a:tc>
                 <a:extLst>
                   <a:ext uri="{0D108BD9-81ED-4DB2-BD59-A6C34878D82A}">
-                    <a16:rowId xmlns="" xmlns:a16="http://schemas.microsoft.com/office/drawing/2014/main" val="679667022"/>
+                    <a16:rowId xmlns:a16="http://schemas.microsoft.com/office/drawing/2014/main" xmlns="" val="679667022"/>
                   </a:ext>
                 </a:extLst>
               </a:tr>
@@ -13549,7 +13541,7 @@
                 </a:tc>
                 <a:extLst>
                   <a:ext uri="{0D108BD9-81ED-4DB2-BD59-A6C34878D82A}">
-                    <a16:rowId xmlns="" xmlns:a16="http://schemas.microsoft.com/office/drawing/2014/main" val="2034482246"/>
+                    <a16:rowId xmlns:a16="http://schemas.microsoft.com/office/drawing/2014/main" xmlns="" val="2034482246"/>
                   </a:ext>
                 </a:extLst>
               </a:tr>
@@ -13597,7 +13589,7 @@
                 </a:tc>
                 <a:extLst>
                   <a:ext uri="{0D108BD9-81ED-4DB2-BD59-A6C34878D82A}">
-                    <a16:rowId xmlns="" xmlns:a16="http://schemas.microsoft.com/office/drawing/2014/main" val="682465758"/>
+                    <a16:rowId xmlns:a16="http://schemas.microsoft.com/office/drawing/2014/main" xmlns="" val="682465758"/>
                   </a:ext>
                 </a:extLst>
               </a:tr>
@@ -13645,7 +13637,7 @@
                 </a:tc>
                 <a:extLst>
                   <a:ext uri="{0D108BD9-81ED-4DB2-BD59-A6C34878D82A}">
-                    <a16:rowId xmlns="" xmlns:a16="http://schemas.microsoft.com/office/drawing/2014/main" val="4230228483"/>
+                    <a16:rowId xmlns:a16="http://schemas.microsoft.com/office/drawing/2014/main" xmlns="" val="4230228483"/>
                   </a:ext>
                 </a:extLst>
               </a:tr>
@@ -13701,7 +13693,7 @@
                 </a:tc>
                 <a:extLst>
                   <a:ext uri="{0D108BD9-81ED-4DB2-BD59-A6C34878D82A}">
-                    <a16:rowId xmlns="" xmlns:a16="http://schemas.microsoft.com/office/drawing/2014/main" val="3329658239"/>
+                    <a16:rowId xmlns:a16="http://schemas.microsoft.com/office/drawing/2014/main" xmlns="" val="3329658239"/>
                   </a:ext>
                 </a:extLst>
               </a:tr>
@@ -15931,14 +15923,14 @@
                 <a:gridCol w="5533314">
                   <a:extLst>
                     <a:ext uri="{9D8B030D-6E8A-4147-A177-3AD203B41FA5}">
-                      <a16:colId xmlns="" xmlns:a16="http://schemas.microsoft.com/office/drawing/2014/main" val="48614039"/>
+                      <a16:colId xmlns:a16="http://schemas.microsoft.com/office/drawing/2014/main" xmlns="" val="48614039"/>
                     </a:ext>
                   </a:extLst>
                 </a:gridCol>
                 <a:gridCol w="5533314">
                   <a:extLst>
                     <a:ext uri="{9D8B030D-6E8A-4147-A177-3AD203B41FA5}">
-                      <a16:colId xmlns="" xmlns:a16="http://schemas.microsoft.com/office/drawing/2014/main" val="1124546490"/>
+                      <a16:colId xmlns:a16="http://schemas.microsoft.com/office/drawing/2014/main" xmlns="" val="1124546490"/>
                     </a:ext>
                   </a:extLst>
                 </a:gridCol>
@@ -16003,7 +15995,7 @@
                 </a:tc>
                 <a:extLst>
                   <a:ext uri="{0D108BD9-81ED-4DB2-BD59-A6C34878D82A}">
-                    <a16:rowId xmlns="" xmlns:a16="http://schemas.microsoft.com/office/drawing/2014/main" val="679667022"/>
+                    <a16:rowId xmlns:a16="http://schemas.microsoft.com/office/drawing/2014/main" xmlns="" val="679667022"/>
                   </a:ext>
                 </a:extLst>
               </a:tr>
@@ -16056,7 +16048,7 @@
                 </a:tc>
                 <a:extLst>
                   <a:ext uri="{0D108BD9-81ED-4DB2-BD59-A6C34878D82A}">
-                    <a16:rowId xmlns="" xmlns:a16="http://schemas.microsoft.com/office/drawing/2014/main" val="2034482246"/>
+                    <a16:rowId xmlns:a16="http://schemas.microsoft.com/office/drawing/2014/main" xmlns="" val="2034482246"/>
                   </a:ext>
                 </a:extLst>
               </a:tr>
@@ -16105,7 +16097,7 @@
                 </a:tc>
                 <a:extLst>
                   <a:ext uri="{0D108BD9-81ED-4DB2-BD59-A6C34878D82A}">
-                    <a16:rowId xmlns="" xmlns:a16="http://schemas.microsoft.com/office/drawing/2014/main" val="682465758"/>
+                    <a16:rowId xmlns:a16="http://schemas.microsoft.com/office/drawing/2014/main" xmlns="" val="682465758"/>
                   </a:ext>
                 </a:extLst>
               </a:tr>
@@ -16158,7 +16150,7 @@
                 </a:tc>
                 <a:extLst>
                   <a:ext uri="{0D108BD9-81ED-4DB2-BD59-A6C34878D82A}">
-                    <a16:rowId xmlns="" xmlns:a16="http://schemas.microsoft.com/office/drawing/2014/main" val="4230228483"/>
+                    <a16:rowId xmlns:a16="http://schemas.microsoft.com/office/drawing/2014/main" xmlns="" val="4230228483"/>
                   </a:ext>
                 </a:extLst>
               </a:tr>
@@ -16206,7 +16198,7 @@
                 </a:tc>
                 <a:extLst>
                   <a:ext uri="{0D108BD9-81ED-4DB2-BD59-A6C34878D82A}">
-                    <a16:rowId xmlns="" xmlns:a16="http://schemas.microsoft.com/office/drawing/2014/main" val="3329658239"/>
+                    <a16:rowId xmlns:a16="http://schemas.microsoft.com/office/drawing/2014/main" xmlns="" val="3329658239"/>
                   </a:ext>
                 </a:extLst>
               </a:tr>
@@ -16838,7 +16830,12 @@
             <p:ph idx="1"/>
           </p:nvPr>
         </p:nvSpPr>
-        <p:spPr/>
+        <p:spPr>
+          <a:xfrm>
+            <a:off x="838200" y="2828636"/>
+            <a:ext cx="10515600" cy="3348326"/>
+          </a:xfrm>
+        </p:spPr>
         <p:txBody>
           <a:bodyPr>
             <a:normAutofit/>
@@ -16846,14 +16843,12 @@
           <a:lstStyle/>
           <a:p>
             <a:r>
+              <a:rPr lang="en-US" dirty="0" smtClean="0"/>
+              <a:t>In </a:t>
+            </a:r>
+            <a:r>
               <a:rPr lang="en-US" dirty="0"/>
-              <a:t>Instantiate a NavigationPage and pass in a ContentPage</a:t>
-            </a:r>
-          </a:p>
-          <a:p>
-            <a:r>
-              <a:rPr lang="en-US" dirty="0"/>
-              <a:t>In the child page:</a:t>
+              <a:t>the child page:</a:t>
             </a:r>
           </a:p>
           <a:p>
@@ -16895,6 +16890,133 @@
           </a:p>
         </p:txBody>
       </p:sp>
+      <p:grpSp>
+        <p:nvGrpSpPr>
+          <p:cNvPr id="6" name="Group 5"/>
+          <p:cNvGrpSpPr/>
+          <p:nvPr/>
+        </p:nvGrpSpPr>
+        <p:grpSpPr>
+          <a:xfrm>
+            <a:off x="0" y="1780588"/>
+            <a:ext cx="12192000" cy="851767"/>
+            <a:chOff x="0" y="1561233"/>
+            <a:chExt cx="12192000" cy="851767"/>
+          </a:xfrm>
+        </p:grpSpPr>
+        <p:sp>
+          <p:nvSpPr>
+            <p:cNvPr id="4" name="Rectangle 3"/>
+            <p:cNvSpPr/>
+            <p:nvPr/>
+          </p:nvSpPr>
+          <p:spPr>
+            <a:xfrm>
+              <a:off x="0" y="1561233"/>
+              <a:ext cx="12192000" cy="851767"/>
+            </a:xfrm>
+            <a:prstGeom prst="rect">
+              <a:avLst/>
+            </a:prstGeom>
+            <a:solidFill>
+              <a:srgbClr val="346CC8"/>
+            </a:solidFill>
+            <a:ln>
+              <a:noFill/>
+            </a:ln>
+          </p:spPr>
+          <p:style>
+            <a:lnRef idx="2">
+              <a:schemeClr val="accent1">
+                <a:shade val="50000"/>
+              </a:schemeClr>
+            </a:lnRef>
+            <a:fillRef idx="1">
+              <a:schemeClr val="accent1"/>
+            </a:fillRef>
+            <a:effectRef idx="0">
+              <a:schemeClr val="accent1"/>
+            </a:effectRef>
+            <a:fontRef idx="minor">
+              <a:schemeClr val="lt1"/>
+            </a:fontRef>
+          </p:style>
+          <p:txBody>
+            <a:bodyPr rtlCol="0" anchor="ctr"/>
+            <a:lstStyle/>
+            <a:p>
+              <a:pPr algn="ctr"/>
+              <a:endParaRPr lang="en-US" dirty="0" smtClean="0">
+                <a:solidFill>
+                  <a:schemeClr val="bg1"/>
+                </a:solidFill>
+              </a:endParaRPr>
+            </a:p>
+          </p:txBody>
+        </p:sp>
+        <p:sp>
+          <p:nvSpPr>
+            <p:cNvPr id="5" name="TextBox 4"/>
+            <p:cNvSpPr txBox="1"/>
+            <p:nvPr/>
+          </p:nvSpPr>
+          <p:spPr>
+            <a:xfrm>
+              <a:off x="838200" y="1725468"/>
+              <a:ext cx="9207769" cy="523220"/>
+            </a:xfrm>
+            <a:prstGeom prst="rect">
+              <a:avLst/>
+            </a:prstGeom>
+            <a:noFill/>
+          </p:spPr>
+          <p:txBody>
+            <a:bodyPr wrap="none" rtlCol="0">
+              <a:spAutoFit/>
+            </a:bodyPr>
+            <a:lstStyle/>
+            <a:p>
+              <a:r>
+                <a:rPr lang="en-US" sz="2800" dirty="0">
+                  <a:solidFill>
+                    <a:srgbClr val="FFFFFF"/>
+                  </a:solidFill>
+                </a:rPr>
+                <a:t>Instantiate a </a:t>
+              </a:r>
+              <a:r>
+                <a:rPr lang="en-US" sz="2800" dirty="0" err="1">
+                  <a:solidFill>
+                    <a:srgbClr val="FFFFFF"/>
+                  </a:solidFill>
+                </a:rPr>
+                <a:t>NavigationPage</a:t>
+              </a:r>
+              <a:r>
+                <a:rPr lang="en-US" sz="2800" dirty="0">
+                  <a:solidFill>
+                    <a:srgbClr val="FFFFFF"/>
+                  </a:solidFill>
+                </a:rPr>
+                <a:t> and pass in a </a:t>
+              </a:r>
+              <a:r>
+                <a:rPr lang="en-US" sz="2800" dirty="0" err="1" smtClean="0">
+                  <a:solidFill>
+                    <a:srgbClr val="FFFFFF"/>
+                  </a:solidFill>
+                </a:rPr>
+                <a:t>ContentPage</a:t>
+              </a:r>
+              <a:endParaRPr lang="en-US" sz="2800" dirty="0">
+                <a:solidFill>
+                  <a:srgbClr val="FFFFFF"/>
+                </a:solidFill>
+              </a:endParaRPr>
+            </a:p>
+          </p:txBody>
+        </p:sp>
+      </p:grpSp>
     </p:spTree>
     <p:extLst>
       <p:ext uri="{BB962C8B-B14F-4D97-AF65-F5344CB8AC3E}">
@@ -17178,7 +17300,7 @@
   <a:extraClrSchemeLst/>
   <a:extLst>
     <a:ext uri="{05A4C25C-085E-4340-85A3-A5531E510DB2}">
-      <thm15:themeFamily xmlns:thm15="http://schemas.microsoft.com/office/thememl/2012/main" xmlns="" name="Office Theme" id="{62F939B6-93AF-4DB8-9C6B-D6C7DFDC589F}" vid="{4A3C46E8-61CC-4603-A589-7422A47A8E4A}"/>
+      <thm15:themeFamily xmlns="" xmlns:thm15="http://schemas.microsoft.com/office/thememl/2012/main" name="Office Theme" id="{62F939B6-93AF-4DB8-9C6B-D6C7DFDC589F}" vid="{4A3C46E8-61CC-4603-A589-7422A47A8E4A}"/>
     </a:ext>
   </a:extLst>
 </a:theme>

</xml_diff>